<commit_message>
Fix issue #32 (Hello X-Arguments cut off on folio 2 of Ch. 4 "Maven")
</commit_message>
<xml_diff>
--- a/04_Maven/Maven_slides.pptx
+++ b/04_Maven/Maven_slides.pptx
@@ -266,7 +266,7 @@
           <a:p>
             <a:fld id="{311397B5-8C69-41E8-80AB-B2B64B3912C3}" type="datetimeFigureOut">
               <a:rPr lang="de-DE" smtClean="0"/>
-              <a:t>05.02.2018</a:t>
+              <a:t>20.03.2018</a:t>
             </a:fld>
             <a:endParaRPr lang="de-DE"/>
           </a:p>
@@ -436,7 +436,7 @@
           <a:p>
             <a:fld id="{311397B5-8C69-41E8-80AB-B2B64B3912C3}" type="datetimeFigureOut">
               <a:rPr lang="de-DE" smtClean="0"/>
-              <a:t>05.02.2018</a:t>
+              <a:t>20.03.2018</a:t>
             </a:fld>
             <a:endParaRPr lang="de-DE"/>
           </a:p>
@@ -616,7 +616,7 @@
           <a:p>
             <a:fld id="{311397B5-8C69-41E8-80AB-B2B64B3912C3}" type="datetimeFigureOut">
               <a:rPr lang="de-DE" smtClean="0"/>
-              <a:t>05.02.2018</a:t>
+              <a:t>20.03.2018</a:t>
             </a:fld>
             <a:endParaRPr lang="de-DE"/>
           </a:p>
@@ -786,7 +786,7 @@
           <a:p>
             <a:fld id="{311397B5-8C69-41E8-80AB-B2B64B3912C3}" type="datetimeFigureOut">
               <a:rPr lang="de-DE" smtClean="0"/>
-              <a:t>05.02.2018</a:t>
+              <a:t>20.03.2018</a:t>
             </a:fld>
             <a:endParaRPr lang="de-DE"/>
           </a:p>
@@ -1032,7 +1032,7 @@
           <a:p>
             <a:fld id="{311397B5-8C69-41E8-80AB-B2B64B3912C3}" type="datetimeFigureOut">
               <a:rPr lang="de-DE" smtClean="0"/>
-              <a:t>05.02.2018</a:t>
+              <a:t>20.03.2018</a:t>
             </a:fld>
             <a:endParaRPr lang="de-DE"/>
           </a:p>
@@ -1264,7 +1264,7 @@
           <a:p>
             <a:fld id="{311397B5-8C69-41E8-80AB-B2B64B3912C3}" type="datetimeFigureOut">
               <a:rPr lang="de-DE" smtClean="0"/>
-              <a:t>05.02.2018</a:t>
+              <a:t>20.03.2018</a:t>
             </a:fld>
             <a:endParaRPr lang="de-DE"/>
           </a:p>
@@ -1631,7 +1631,7 @@
           <a:p>
             <a:fld id="{311397B5-8C69-41E8-80AB-B2B64B3912C3}" type="datetimeFigureOut">
               <a:rPr lang="de-DE" smtClean="0"/>
-              <a:t>05.02.2018</a:t>
+              <a:t>20.03.2018</a:t>
             </a:fld>
             <a:endParaRPr lang="de-DE"/>
           </a:p>
@@ -1749,7 +1749,7 @@
           <a:p>
             <a:fld id="{311397B5-8C69-41E8-80AB-B2B64B3912C3}" type="datetimeFigureOut">
               <a:rPr lang="de-DE" smtClean="0"/>
-              <a:t>05.02.2018</a:t>
+              <a:t>20.03.2018</a:t>
             </a:fld>
             <a:endParaRPr lang="de-DE"/>
           </a:p>
@@ -1844,7 +1844,7 @@
           <a:p>
             <a:fld id="{311397B5-8C69-41E8-80AB-B2B64B3912C3}" type="datetimeFigureOut">
               <a:rPr lang="de-DE" smtClean="0"/>
-              <a:t>05.02.2018</a:t>
+              <a:t>20.03.2018</a:t>
             </a:fld>
             <a:endParaRPr lang="de-DE"/>
           </a:p>
@@ -2121,7 +2121,7 @@
           <a:p>
             <a:fld id="{311397B5-8C69-41E8-80AB-B2B64B3912C3}" type="datetimeFigureOut">
               <a:rPr lang="de-DE" smtClean="0"/>
-              <a:t>05.02.2018</a:t>
+              <a:t>20.03.2018</a:t>
             </a:fld>
             <a:endParaRPr lang="de-DE"/>
           </a:p>
@@ -2374,7 +2374,7 @@
           <a:p>
             <a:fld id="{311397B5-8C69-41E8-80AB-B2B64B3912C3}" type="datetimeFigureOut">
               <a:rPr lang="de-DE" smtClean="0"/>
-              <a:t>05.02.2018</a:t>
+              <a:t>20.03.2018</a:t>
             </a:fld>
             <a:endParaRPr lang="de-DE"/>
           </a:p>
@@ -2587,7 +2587,7 @@
           <a:p>
             <a:fld id="{311397B5-8C69-41E8-80AB-B2B64B3912C3}" type="datetimeFigureOut">
               <a:rPr lang="de-DE" smtClean="0"/>
-              <a:t>05.02.2018</a:t>
+              <a:t>20.03.2018</a:t>
             </a:fld>
             <a:endParaRPr lang="de-DE"/>
           </a:p>
@@ -3021,15 +3021,7 @@
                   <a:srgbClr val="C00000"/>
                 </a:solidFill>
               </a:rPr>
-              <a:t>Chapter </a:t>
-            </a:r>
-            <a:r>
-              <a:rPr lang="de-DE" sz="6000" b="1" dirty="0" smtClean="0">
-                <a:solidFill>
-                  <a:srgbClr val="C00000"/>
-                </a:solidFill>
-              </a:rPr>
-              <a:t>4: </a:t>
+              <a:t>Chapter 4: </a:t>
             </a:r>
             <a:r>
               <a:rPr lang="de-DE" sz="6000" b="1" dirty="0" err="1" smtClean="0">
@@ -9703,8 +9695,8 @@
         </p:nvSpPr>
         <p:spPr bwMode="auto">
           <a:xfrm>
-            <a:off x="1715586" y="3595026"/>
-            <a:ext cx="4293326" cy="2585323"/>
+            <a:off x="1715585" y="3733525"/>
+            <a:ext cx="8699865" cy="2308324"/>
           </a:xfrm>
           <a:prstGeom prst="rect">
             <a:avLst/>

</xml_diff>